<commit_message>
updated E/R file and removal of old files
</commit_message>
<xml_diff>
--- a/DIS-project - E_R.pptx
+++ b/DIS-project - E_R.pptx
@@ -891,7 +891,7 @@
   <p:cSld>
     <p:spTree>
       <p:nvGrpSpPr>
-        <p:cNvPr id="68" name="Shape 68"/>
+        <p:cNvPr id="66" name="Shape 66"/>
         <p:cNvGrpSpPr/>
         <p:nvPr/>
       </p:nvGrpSpPr>
@@ -905,7 +905,7 @@
       </p:grpSpPr>
       <p:sp>
         <p:nvSpPr>
-          <p:cNvPr id="69" name="Google Shape;69;g2e4428c0439_0_5:notes"/>
+          <p:cNvPr id="67" name="Google Shape;67;g2e4428c0439_0_5:notes"/>
           <p:cNvSpPr/>
           <p:nvPr>
             <p:ph idx="2" type="sldImg"/>
@@ -940,7 +940,7 @@
       </p:sp>
       <p:sp>
         <p:nvSpPr>
-          <p:cNvPr id="70" name="Google Shape;70;g2e4428c0439_0_5:notes"/>
+          <p:cNvPr id="68" name="Google Shape;68;g2e4428c0439_0_5:notes"/>
           <p:cNvSpPr txBox="1"/>
           <p:nvPr>
             <p:ph idx="1" type="body"/>
@@ -5799,112 +5799,6 @@
       <p:sp>
         <p:nvSpPr>
           <p:cNvPr id="61" name="Google Shape;61;p14"/>
-          <p:cNvSpPr txBox="1"/>
-          <p:nvPr>
-            <p:ph idx="1" type="body"/>
-          </p:nvPr>
-        </p:nvSpPr>
-        <p:spPr>
-          <a:xfrm>
-            <a:off x="311700" y="1152475"/>
-            <a:ext cx="8520600" cy="3416400"/>
-          </a:xfrm>
-          <a:prstGeom prst="rect">
-            <a:avLst/>
-          </a:prstGeom>
-        </p:spPr>
-        <p:txBody>
-          <a:bodyPr anchorCtr="0" anchor="t" bIns="91425" lIns="91425" spcFirstLastPara="1" rIns="91425" wrap="square" tIns="91425">
-            <a:normAutofit/>
-          </a:bodyPr>
-          <a:lstStyle/>
-          <a:p>
-            <a:pPr indent="0" lvl="0" marL="0" rtl="0" algn="ctr">
-              <a:lnSpc>
-                <a:spcPct val="100000"/>
-              </a:lnSpc>
-              <a:spcBef>
-                <a:spcPts val="0"/>
-              </a:spcBef>
-              <a:spcAft>
-                <a:spcPts val="0"/>
-              </a:spcAft>
-              <a:buNone/>
-            </a:pPr>
-            <a:r>
-              <a:t/>
-            </a:r>
-            <a:endParaRPr sz="1400" u="sng">
-              <a:solidFill>
-                <a:srgbClr val="000000"/>
-              </a:solidFill>
-            </a:endParaRPr>
-          </a:p>
-          <a:p>
-            <a:pPr indent="0" lvl="0" marL="0" rtl="0" algn="l">
-              <a:spcBef>
-                <a:spcPts val="0"/>
-              </a:spcBef>
-              <a:spcAft>
-                <a:spcPts val="1200"/>
-              </a:spcAft>
-              <a:buNone/>
-            </a:pPr>
-            <a:r>
-              <a:t/>
-            </a:r>
-            <a:endParaRPr/>
-          </a:p>
-        </p:txBody>
-      </p:sp>
-      <p:sp>
-        <p:nvSpPr>
-          <p:cNvPr id="62" name="Google Shape;62;p14"/>
-          <p:cNvSpPr txBox="1"/>
-          <p:nvPr/>
-        </p:nvSpPr>
-        <p:spPr>
-          <a:xfrm>
-            <a:off x="881875" y="1583925"/>
-            <a:ext cx="1018800" cy="744900"/>
-          </a:xfrm>
-          <a:prstGeom prst="rect">
-            <a:avLst/>
-          </a:prstGeom>
-          <a:noFill/>
-          <a:ln>
-            <a:noFill/>
-          </a:ln>
-        </p:spPr>
-        <p:txBody>
-          <a:bodyPr anchorCtr="0" anchor="t" bIns="91425" lIns="91425" spcFirstLastPara="1" rIns="91425" wrap="square" tIns="91425">
-            <a:noAutofit/>
-          </a:bodyPr>
-          <a:lstStyle/>
-          <a:p>
-            <a:pPr indent="0" lvl="0" marL="0" rtl="0" algn="l">
-              <a:spcBef>
-                <a:spcPts val="0"/>
-              </a:spcBef>
-              <a:spcAft>
-                <a:spcPts val="0"/>
-              </a:spcAft>
-              <a:buNone/>
-            </a:pPr>
-            <a:r>
-              <a:t/>
-            </a:r>
-            <a:endParaRPr sz="1800">
-              <a:solidFill>
-                <a:schemeClr val="dk2"/>
-              </a:solidFill>
-            </a:endParaRPr>
-          </a:p>
-        </p:txBody>
-      </p:sp>
-      <p:sp>
-        <p:nvSpPr>
-          <p:cNvPr id="63" name="Google Shape;63;p14"/>
           <p:cNvSpPr/>
           <p:nvPr/>
         </p:nvSpPr>
@@ -5954,7 +5848,7 @@
       </p:sp>
       <p:sp>
         <p:nvSpPr>
-          <p:cNvPr id="64" name="Google Shape;64;p14"/>
+          <p:cNvPr id="62" name="Google Shape;62;p14"/>
           <p:cNvSpPr/>
           <p:nvPr/>
         </p:nvSpPr>
@@ -6004,7 +5898,7 @@
       </p:sp>
       <p:sp>
         <p:nvSpPr>
-          <p:cNvPr id="65" name="Google Shape;65;p14"/>
+          <p:cNvPr id="63" name="Google Shape;63;p14"/>
           <p:cNvSpPr/>
           <p:nvPr/>
         </p:nvSpPr>
@@ -6054,9 +5948,9 @@
       </p:sp>
       <p:cxnSp>
         <p:nvCxnSpPr>
-          <p:cNvPr id="66" name="Google Shape;66;p14"/>
+          <p:cNvPr id="64" name="Google Shape;64;p14"/>
           <p:cNvCxnSpPr>
-            <a:stCxn id="64" idx="4"/>
+            <a:stCxn id="62" idx="4"/>
           </p:cNvCxnSpPr>
           <p:nvPr/>
         </p:nvCxnSpPr>
@@ -6082,7 +5976,7 @@
       </p:cxnSp>
       <p:cxnSp>
         <p:nvCxnSpPr>
-          <p:cNvPr id="67" name="Google Shape;67;p14"/>
+          <p:cNvPr id="65" name="Google Shape;65;p14"/>
           <p:cNvCxnSpPr/>
           <p:nvPr/>
         </p:nvCxnSpPr>
@@ -6119,7 +6013,7 @@
   <p:cSld>
     <p:spTree>
       <p:nvGrpSpPr>
-        <p:cNvPr id="71" name="Shape 71"/>
+        <p:cNvPr id="69" name="Shape 69"/>
         <p:cNvGrpSpPr/>
         <p:nvPr/>
       </p:nvGrpSpPr>
@@ -6133,7 +6027,7 @@
       </p:grpSpPr>
       <p:sp>
         <p:nvSpPr>
-          <p:cNvPr id="72" name="Google Shape;72;p15"/>
+          <p:cNvPr id="70" name="Google Shape;70;p15"/>
           <p:cNvSpPr txBox="1"/>
           <p:nvPr>
             <p:ph type="title"/>
@@ -6181,90 +6075,7 @@
       </p:sp>
       <p:sp>
         <p:nvSpPr>
-          <p:cNvPr id="73" name="Google Shape;73;p15"/>
-          <p:cNvSpPr txBox="1"/>
-          <p:nvPr>
-            <p:ph idx="1" type="body"/>
-          </p:nvPr>
-        </p:nvSpPr>
-        <p:spPr>
-          <a:xfrm>
-            <a:off x="311700" y="1232775"/>
-            <a:ext cx="8520600" cy="3416400"/>
-          </a:xfrm>
-          <a:prstGeom prst="rect">
-            <a:avLst/>
-          </a:prstGeom>
-        </p:spPr>
-        <p:txBody>
-          <a:bodyPr anchorCtr="0" anchor="t" bIns="91425" lIns="91425" spcFirstLastPara="1" rIns="91425" wrap="square" tIns="91425">
-            <a:normAutofit/>
-          </a:bodyPr>
-          <a:lstStyle/>
-          <a:p>
-            <a:pPr indent="0" lvl="0" marL="0" rtl="0" algn="ctr">
-              <a:lnSpc>
-                <a:spcPct val="100000"/>
-              </a:lnSpc>
-              <a:spcBef>
-                <a:spcPts val="0"/>
-              </a:spcBef>
-              <a:spcAft>
-                <a:spcPts val="0"/>
-              </a:spcAft>
-              <a:buNone/>
-            </a:pPr>
-            <a:r>
-              <a:t/>
-            </a:r>
-            <a:endParaRPr sz="1400" u="sng">
-              <a:solidFill>
-                <a:srgbClr val="000000"/>
-              </a:solidFill>
-            </a:endParaRPr>
-          </a:p>
-          <a:p>
-            <a:pPr indent="0" lvl="0" marL="0" rtl="0" algn="l">
-              <a:lnSpc>
-                <a:spcPct val="100000"/>
-              </a:lnSpc>
-              <a:spcBef>
-                <a:spcPts val="0"/>
-              </a:spcBef>
-              <a:spcAft>
-                <a:spcPts val="0"/>
-              </a:spcAft>
-              <a:buNone/>
-            </a:pPr>
-            <a:r>
-              <a:t/>
-            </a:r>
-            <a:endParaRPr sz="1400">
-              <a:solidFill>
-                <a:srgbClr val="000000"/>
-              </a:solidFill>
-            </a:endParaRPr>
-          </a:p>
-          <a:p>
-            <a:pPr indent="0" lvl="0" marL="0" rtl="0" algn="l">
-              <a:spcBef>
-                <a:spcPts val="0"/>
-              </a:spcBef>
-              <a:spcAft>
-                <a:spcPts val="1200"/>
-              </a:spcAft>
-              <a:buNone/>
-            </a:pPr>
-            <a:r>
-              <a:t/>
-            </a:r>
-            <a:endParaRPr/>
-          </a:p>
-        </p:txBody>
-      </p:sp>
-      <p:sp>
-        <p:nvSpPr>
-          <p:cNvPr id="74" name="Google Shape;74;p15"/>
+          <p:cNvPr id="71" name="Google Shape;71;p15"/>
           <p:cNvSpPr/>
           <p:nvPr/>
         </p:nvSpPr>
@@ -6314,7 +6125,7 @@
       </p:sp>
       <p:sp>
         <p:nvSpPr>
-          <p:cNvPr id="75" name="Google Shape;75;p15"/>
+          <p:cNvPr id="72" name="Google Shape;72;p15"/>
           <p:cNvSpPr/>
           <p:nvPr/>
         </p:nvSpPr>
@@ -6364,7 +6175,7 @@
       </p:sp>
       <p:sp>
         <p:nvSpPr>
-          <p:cNvPr id="76" name="Google Shape;76;p15"/>
+          <p:cNvPr id="73" name="Google Shape;73;p15"/>
           <p:cNvSpPr/>
           <p:nvPr/>
         </p:nvSpPr>
@@ -6414,7 +6225,7 @@
       </p:sp>
       <p:sp>
         <p:nvSpPr>
-          <p:cNvPr id="77" name="Google Shape;77;p15"/>
+          <p:cNvPr id="74" name="Google Shape;74;p15"/>
           <p:cNvSpPr/>
           <p:nvPr/>
         </p:nvSpPr>
@@ -6464,7 +6275,7 @@
       </p:sp>
       <p:sp>
         <p:nvSpPr>
-          <p:cNvPr id="78" name="Google Shape;78;p15"/>
+          <p:cNvPr id="75" name="Google Shape;75;p15"/>
           <p:cNvSpPr/>
           <p:nvPr/>
         </p:nvSpPr>
@@ -6514,7 +6325,7 @@
       </p:sp>
       <p:sp>
         <p:nvSpPr>
-          <p:cNvPr id="79" name="Google Shape;79;p15"/>
+          <p:cNvPr id="76" name="Google Shape;76;p15"/>
           <p:cNvSpPr/>
           <p:nvPr/>
         </p:nvSpPr>
@@ -6564,7 +6375,7 @@
       </p:sp>
       <p:sp>
         <p:nvSpPr>
-          <p:cNvPr id="80" name="Google Shape;80;p15"/>
+          <p:cNvPr id="77" name="Google Shape;77;p15"/>
           <p:cNvSpPr/>
           <p:nvPr/>
         </p:nvSpPr>
@@ -6614,7 +6425,7 @@
       </p:sp>
       <p:sp>
         <p:nvSpPr>
-          <p:cNvPr id="81" name="Google Shape;81;p15"/>
+          <p:cNvPr id="78" name="Google Shape;78;p15"/>
           <p:cNvSpPr/>
           <p:nvPr/>
         </p:nvSpPr>
@@ -6664,7 +6475,7 @@
       </p:sp>
       <p:sp>
         <p:nvSpPr>
-          <p:cNvPr id="82" name="Google Shape;82;p15"/>
+          <p:cNvPr id="79" name="Google Shape;79;p15"/>
           <p:cNvSpPr/>
           <p:nvPr/>
         </p:nvSpPr>
@@ -6714,7 +6525,7 @@
       </p:sp>
       <p:sp>
         <p:nvSpPr>
-          <p:cNvPr id="83" name="Google Shape;83;p15"/>
+          <p:cNvPr id="80" name="Google Shape;80;p15"/>
           <p:cNvSpPr/>
           <p:nvPr/>
         </p:nvSpPr>
@@ -6764,7 +6575,7 @@
       </p:sp>
       <p:sp>
         <p:nvSpPr>
-          <p:cNvPr id="84" name="Google Shape;84;p15"/>
+          <p:cNvPr id="81" name="Google Shape;81;p15"/>
           <p:cNvSpPr/>
           <p:nvPr/>
         </p:nvSpPr>
@@ -6814,9 +6625,9 @@
       </p:sp>
       <p:cxnSp>
         <p:nvCxnSpPr>
-          <p:cNvPr id="85" name="Google Shape;85;p15"/>
+          <p:cNvPr id="82" name="Google Shape;82;p15"/>
           <p:cNvCxnSpPr>
-            <a:stCxn id="76" idx="4"/>
+            <a:stCxn id="73" idx="4"/>
           </p:cNvCxnSpPr>
           <p:nvPr/>
         </p:nvCxnSpPr>
@@ -6842,7 +6653,7 @@
       </p:cxnSp>
       <p:cxnSp>
         <p:nvCxnSpPr>
-          <p:cNvPr id="86" name="Google Shape;86;p15"/>
+          <p:cNvPr id="83" name="Google Shape;83;p15"/>
           <p:cNvCxnSpPr/>
           <p:nvPr/>
         </p:nvCxnSpPr>
@@ -6868,9 +6679,9 @@
       </p:cxnSp>
       <p:cxnSp>
         <p:nvCxnSpPr>
-          <p:cNvPr id="87" name="Google Shape;87;p15"/>
+          <p:cNvPr id="84" name="Google Shape;84;p15"/>
           <p:cNvCxnSpPr>
-            <a:stCxn id="79" idx="2"/>
+            <a:stCxn id="76" idx="2"/>
           </p:cNvCxnSpPr>
           <p:nvPr/>
         </p:nvCxnSpPr>
@@ -6896,10 +6707,10 @@
       </p:cxnSp>
       <p:cxnSp>
         <p:nvCxnSpPr>
-          <p:cNvPr id="88" name="Google Shape;88;p15"/>
+          <p:cNvPr id="85" name="Google Shape;85;p15"/>
           <p:cNvCxnSpPr>
-            <a:stCxn id="80" idx="2"/>
-            <a:endCxn id="74" idx="3"/>
+            <a:stCxn id="77" idx="2"/>
+            <a:endCxn id="71" idx="3"/>
           </p:cNvCxnSpPr>
           <p:nvPr/>
         </p:nvCxnSpPr>
@@ -6925,9 +6736,9 @@
       </p:cxnSp>
       <p:cxnSp>
         <p:nvCxnSpPr>
-          <p:cNvPr id="89" name="Google Shape;89;p15"/>
+          <p:cNvPr id="86" name="Google Shape;86;p15"/>
           <p:cNvCxnSpPr>
-            <a:endCxn id="78" idx="1"/>
+            <a:endCxn id="75" idx="1"/>
           </p:cNvCxnSpPr>
           <p:nvPr/>
         </p:nvCxnSpPr>
@@ -6953,7 +6764,7 @@
       </p:cxnSp>
       <p:cxnSp>
         <p:nvCxnSpPr>
-          <p:cNvPr id="90" name="Google Shape;90;p15"/>
+          <p:cNvPr id="87" name="Google Shape;87;p15"/>
           <p:cNvCxnSpPr/>
           <p:nvPr/>
         </p:nvCxnSpPr>
@@ -6979,7 +6790,7 @@
       </p:cxnSp>
       <p:cxnSp>
         <p:nvCxnSpPr>
-          <p:cNvPr id="91" name="Google Shape;91;p15"/>
+          <p:cNvPr id="88" name="Google Shape;88;p15"/>
           <p:cNvCxnSpPr/>
           <p:nvPr/>
         </p:nvCxnSpPr>
@@ -7005,9 +6816,9 @@
       </p:cxnSp>
       <p:cxnSp>
         <p:nvCxnSpPr>
-          <p:cNvPr id="92" name="Google Shape;92;p15"/>
+          <p:cNvPr id="89" name="Google Shape;89;p15"/>
           <p:cNvCxnSpPr>
-            <a:endCxn id="82" idx="7"/>
+            <a:endCxn id="79" idx="7"/>
           </p:cNvCxnSpPr>
           <p:nvPr/>
         </p:nvCxnSpPr>
@@ -7033,10 +6844,10 @@
       </p:cxnSp>
       <p:cxnSp>
         <p:nvCxnSpPr>
-          <p:cNvPr id="93" name="Google Shape;93;p15"/>
+          <p:cNvPr id="90" name="Google Shape;90;p15"/>
           <p:cNvCxnSpPr>
-            <a:stCxn id="77" idx="6"/>
-            <a:endCxn id="74" idx="1"/>
+            <a:stCxn id="74" idx="6"/>
+            <a:endCxn id="71" idx="1"/>
           </p:cNvCxnSpPr>
           <p:nvPr/>
         </p:nvCxnSpPr>
@@ -7062,9 +6873,9 @@
       </p:cxnSp>
       <p:cxnSp>
         <p:nvCxnSpPr>
-          <p:cNvPr id="94" name="Google Shape;94;p15"/>
+          <p:cNvPr id="91" name="Google Shape;91;p15"/>
           <p:cNvCxnSpPr>
-            <a:stCxn id="75" idx="6"/>
+            <a:stCxn id="72" idx="6"/>
           </p:cNvCxnSpPr>
           <p:nvPr/>
         </p:nvCxnSpPr>
@@ -7090,7 +6901,7 @@
       </p:cxnSp>
       <p:sp>
         <p:nvSpPr>
-          <p:cNvPr id="95" name="Google Shape;95;p15"/>
+          <p:cNvPr id="92" name="Google Shape;92;p15"/>
           <p:cNvSpPr txBox="1"/>
           <p:nvPr/>
         </p:nvSpPr>

</xml_diff>